<commit_message>
Added final part where B is purely imaginary and added the new figures as well. From here we should be good to turn in/email it to him unless you want to add anything else
</commit_message>
<xml_diff>
--- a/Presentation1.pptx
+++ b/Presentation1.pptx
@@ -5,7 +5,7 @@
     <p:sldMasterId id="2147483648" r:id="rId1"/>
   </p:sldMasterIdLst>
   <p:notesMasterIdLst>
-    <p:notesMasterId r:id="rId22"/>
+    <p:notesMasterId r:id="rId23"/>
   </p:notesMasterIdLst>
   <p:sldIdLst>
     <p:sldId id="256" r:id="rId2"/>
@@ -28,6 +28,7 @@
     <p:sldId id="273" r:id="rId19"/>
     <p:sldId id="279" r:id="rId20"/>
     <p:sldId id="274" r:id="rId21"/>
+    <p:sldId id="280" r:id="rId22"/>
   </p:sldIdLst>
   <p:sldSz cx="12192000" cy="6858000"/>
   <p:notesSz cx="6858000" cy="9144000"/>
@@ -151,6 +152,7 @@
             <p14:sldId id="273"/>
             <p14:sldId id="279"/>
             <p14:sldId id="274"/>
+            <p14:sldId id="280"/>
           </p14:sldIdLst>
         </p14:section>
       </p14:sectionLst>
@@ -244,7 +246,7 @@
           <a:p>
             <a:fld id="{8C1AF027-6745-4D46-8E2B-37781D0CEB22}" type="datetimeFigureOut">
               <a:rPr lang="en-US" smtClean="0"/>
-              <a:t>4/20/20</a:t>
+              <a:t>4/20/2020</a:t>
             </a:fld>
             <a:endParaRPr lang="en-US"/>
           </a:p>
@@ -1789,7 +1791,7 @@
           <a:p>
             <a:fld id="{D4880492-2AE4-A845-89A9-1CF766BF2D5C}" type="datetimeFigureOut">
               <a:rPr lang="en-US" smtClean="0"/>
-              <a:t>4/20/20</a:t>
+              <a:t>4/20/2020</a:t>
             </a:fld>
             <a:endParaRPr lang="en-US"/>
           </a:p>
@@ -1987,7 +1989,7 @@
           <a:p>
             <a:fld id="{D4880492-2AE4-A845-89A9-1CF766BF2D5C}" type="datetimeFigureOut">
               <a:rPr lang="en-US" smtClean="0"/>
-              <a:t>4/20/20</a:t>
+              <a:t>4/20/2020</a:t>
             </a:fld>
             <a:endParaRPr lang="en-US"/>
           </a:p>
@@ -2195,7 +2197,7 @@
           <a:p>
             <a:fld id="{D4880492-2AE4-A845-89A9-1CF766BF2D5C}" type="datetimeFigureOut">
               <a:rPr lang="en-US" smtClean="0"/>
-              <a:t>4/20/20</a:t>
+              <a:t>4/20/2020</a:t>
             </a:fld>
             <a:endParaRPr lang="en-US"/>
           </a:p>
@@ -2393,7 +2395,7 @@
           <a:p>
             <a:fld id="{D4880492-2AE4-A845-89A9-1CF766BF2D5C}" type="datetimeFigureOut">
               <a:rPr lang="en-US" smtClean="0"/>
-              <a:t>4/20/20</a:t>
+              <a:t>4/20/2020</a:t>
             </a:fld>
             <a:endParaRPr lang="en-US"/>
           </a:p>
@@ -2668,7 +2670,7 @@
           <a:p>
             <a:fld id="{D4880492-2AE4-A845-89A9-1CF766BF2D5C}" type="datetimeFigureOut">
               <a:rPr lang="en-US" smtClean="0"/>
-              <a:t>4/20/20</a:t>
+              <a:t>4/20/2020</a:t>
             </a:fld>
             <a:endParaRPr lang="en-US"/>
           </a:p>
@@ -2933,7 +2935,7 @@
           <a:p>
             <a:fld id="{D4880492-2AE4-A845-89A9-1CF766BF2D5C}" type="datetimeFigureOut">
               <a:rPr lang="en-US" smtClean="0"/>
-              <a:t>4/20/20</a:t>
+              <a:t>4/20/2020</a:t>
             </a:fld>
             <a:endParaRPr lang="en-US"/>
           </a:p>
@@ -3345,7 +3347,7 @@
           <a:p>
             <a:fld id="{D4880492-2AE4-A845-89A9-1CF766BF2D5C}" type="datetimeFigureOut">
               <a:rPr lang="en-US" smtClean="0"/>
-              <a:t>4/20/20</a:t>
+              <a:t>4/20/2020</a:t>
             </a:fld>
             <a:endParaRPr lang="en-US"/>
           </a:p>
@@ -3486,7 +3488,7 @@
           <a:p>
             <a:fld id="{D4880492-2AE4-A845-89A9-1CF766BF2D5C}" type="datetimeFigureOut">
               <a:rPr lang="en-US" smtClean="0"/>
-              <a:t>4/20/20</a:t>
+              <a:t>4/20/2020</a:t>
             </a:fld>
             <a:endParaRPr lang="en-US"/>
           </a:p>
@@ -3599,7 +3601,7 @@
           <a:p>
             <a:fld id="{D4880492-2AE4-A845-89A9-1CF766BF2D5C}" type="datetimeFigureOut">
               <a:rPr lang="en-US" smtClean="0"/>
-              <a:t>4/20/20</a:t>
+              <a:t>4/20/2020</a:t>
             </a:fld>
             <a:endParaRPr lang="en-US"/>
           </a:p>
@@ -3910,7 +3912,7 @@
           <a:p>
             <a:fld id="{D4880492-2AE4-A845-89A9-1CF766BF2D5C}" type="datetimeFigureOut">
               <a:rPr lang="en-US" smtClean="0"/>
-              <a:t>4/20/20</a:t>
+              <a:t>4/20/2020</a:t>
             </a:fld>
             <a:endParaRPr lang="en-US"/>
           </a:p>
@@ -4198,7 +4200,7 @@
           <a:p>
             <a:fld id="{D4880492-2AE4-A845-89A9-1CF766BF2D5C}" type="datetimeFigureOut">
               <a:rPr lang="en-US" smtClean="0"/>
-              <a:t>4/20/20</a:t>
+              <a:t>4/20/2020</a:t>
             </a:fld>
             <a:endParaRPr lang="en-US"/>
           </a:p>
@@ -4439,7 +4441,7 @@
           <a:p>
             <a:fld id="{D4880492-2AE4-A845-89A9-1CF766BF2D5C}" type="datetimeFigureOut">
               <a:rPr lang="en-US" smtClean="0"/>
-              <a:t>4/20/20</a:t>
+              <a:t>4/20/2020</a:t>
             </a:fld>
             <a:endParaRPr lang="en-US"/>
           </a:p>
@@ -4874,12 +4876,14 @@
         </p:nvSpPr>
         <p:spPr/>
         <p:txBody>
-          <a:bodyPr/>
+          <a:bodyPr>
+            <a:normAutofit/>
+          </a:bodyPr>
           <a:lstStyle/>
           <a:p>
             <a:r>
               <a:rPr lang="en-US" dirty="0"/>
-              <a:t>Math 492: Quantum Group</a:t>
+              <a:t>Dynamics of Two-Level Quantum Systems</a:t>
             </a:r>
           </a:p>
         </p:txBody>
@@ -8338,8 +8342,8 @@
           </a:p>
         </p:txBody>
       </p:sp>
-      <mc:AlternateContent xmlns:mc="http://schemas.openxmlformats.org/markup-compatibility/2006" xmlns:a14="http://schemas.microsoft.com/office/drawing/2010/main">
-        <mc:Choice Requires="a14">
+      <mc:AlternateContent xmlns:mc="http://schemas.openxmlformats.org/markup-compatibility/2006">
+        <mc:Choice xmlns:a14="http://schemas.microsoft.com/office/drawing/2010/main" Requires="a14">
           <p:sp>
             <p:nvSpPr>
               <p:cNvPr id="3" name="Content Placeholder 2">
@@ -8893,6 +8897,12 @@
                       </a:rPr>
                       <m:t>=</m:t>
                     </m:r>
+                    <m:r>
+                      <a:rPr lang="en-US" b="0" i="1" smtClean="0">
+                        <a:latin typeface="Cambria Math" panose="02040503050406030204" pitchFamily="18" charset="0"/>
+                      </a:rPr>
+                      <m:t>|</m:t>
+                    </m:r>
                     <m:f>
                       <m:fPr>
                         <m:ctrlPr>
@@ -9057,6 +9067,12 @@
                       </m:den>
                     </m:f>
                     <m:r>
+                      <a:rPr lang="en-US" b="0" i="1" dirty="0" smtClean="0">
+                        <a:latin typeface="Cambria Math" panose="02040503050406030204" pitchFamily="18" charset="0"/>
+                      </a:rPr>
+                      <m:t>|</m:t>
+                    </m:r>
+                    <m:r>
                       <a:rPr lang="en-US" b="0" i="0" smtClean="0">
                         <a:latin typeface="Cambria Math" panose="02040503050406030204" pitchFamily="18" charset="0"/>
                       </a:rPr>
@@ -9066,7 +9082,7 @@
                 </a14:m>
                 <a:r>
                   <a:rPr lang="en-US" dirty="0"/>
-                  <a:t> </a:t>
+                  <a:t> |</a:t>
                 </a:r>
                 <a14:m>
                   <m:oMath xmlns:m="http://schemas.openxmlformats.org/officeDocument/2006/math">
@@ -9258,6 +9274,12 @@
                       </m:den>
                     </m:f>
                     <m:r>
+                      <a:rPr lang="en-US" b="0" i="1" smtClean="0">
+                        <a:latin typeface="Cambria Math" panose="02040503050406030204" pitchFamily="18" charset="0"/>
+                      </a:rPr>
+                      <m:t>|</m:t>
+                    </m:r>
+                    <m:r>
                       <a:rPr lang="en-US" b="0" i="1" dirty="0" smtClean="0">
                         <a:latin typeface="Cambria Math" panose="02040503050406030204" pitchFamily="18" charset="0"/>
                       </a:rPr>
@@ -9267,7 +9289,7 @@
                 </a14:m>
                 <a:r>
                   <a:rPr lang="en-US" dirty="0"/>
-                  <a:t> </a:t>
+                  <a:t>| </a:t>
                 </a:r>
                 <a14:m>
                   <m:oMath xmlns:m="http://schemas.openxmlformats.org/officeDocument/2006/math">
@@ -9412,6 +9434,12 @@
                       <a:rPr lang="en-US" b="0" i="1" smtClean="0">
                         <a:latin typeface="Cambria Math" panose="02040503050406030204" pitchFamily="18" charset="0"/>
                       </a:rPr>
+                      <m:t>|</m:t>
+                    </m:r>
+                    <m:r>
+                      <a:rPr lang="en-US" b="0" i="1" smtClean="0">
+                        <a:latin typeface="Cambria Math" panose="02040503050406030204" pitchFamily="18" charset="0"/>
+                      </a:rPr>
                       <m:t>=</m:t>
                     </m:r>
                     <m:r>
@@ -9445,7 +9473,7 @@
             </p:txBody>
           </p:sp>
         </mc:Choice>
-        <mc:Fallback xmlns="">
+        <mc:Fallback>
           <p:sp>
             <p:nvSpPr>
               <p:cNvPr id="3" name="Content Placeholder 2">
@@ -11962,17 +11990,38 @@
             </a:pPr>
             <a:endParaRPr lang="en-US" dirty="0"/>
           </a:p>
-          <a:p>
-            <a:pPr marL="0" indent="0">
-              <a:buNone/>
-            </a:pPr>
-            <a:r>
-              <a:rPr lang="en-US" dirty="0"/>
-              <a:t>Add picture to emphasize trajectory and ode</a:t>
-            </a:r>
-          </a:p>
         </p:txBody>
       </p:sp>
+      <p:pic>
+        <p:nvPicPr>
+          <p:cNvPr id="7" name="Picture 6">
+            <a:extLst>
+              <a:ext uri="{FF2B5EF4-FFF2-40B4-BE49-F238E27FC236}">
+                <a16:creationId xmlns:a16="http://schemas.microsoft.com/office/drawing/2014/main" id="{53C09ED3-F092-4E30-BA34-FF758EC106C5}"/>
+              </a:ext>
+            </a:extLst>
+          </p:cNvPr>
+          <p:cNvPicPr>
+            <a:picLocks noChangeAspect="1"/>
+          </p:cNvPicPr>
+          <p:nvPr/>
+        </p:nvPicPr>
+        <p:blipFill>
+          <a:blip r:embed="rId3"/>
+          <a:stretch>
+            <a:fillRect/>
+          </a:stretch>
+        </p:blipFill>
+        <p:spPr>
+          <a:xfrm>
+            <a:off x="3750564" y="3066684"/>
+            <a:ext cx="4424172" cy="3426191"/>
+          </a:xfrm>
+          <a:prstGeom prst="rect">
+            <a:avLst/>
+          </a:prstGeom>
+        </p:spPr>
+      </p:pic>
     </p:spTree>
     <p:extLst>
       <p:ext uri="{BB962C8B-B14F-4D97-AF65-F5344CB8AC3E}">
@@ -12031,8 +12080,8 @@
           </a:p>
         </p:txBody>
       </p:sp>
-      <mc:AlternateContent xmlns:mc="http://schemas.openxmlformats.org/markup-compatibility/2006" xmlns:a14="http://schemas.microsoft.com/office/drawing/2010/main">
-        <mc:Choice Requires="a14">
+      <mc:AlternateContent xmlns:mc="http://schemas.openxmlformats.org/markup-compatibility/2006">
+        <mc:Choice xmlns:a14="http://schemas.microsoft.com/office/drawing/2010/main" Requires="a14">
           <p:sp>
             <p:nvSpPr>
               <p:cNvPr id="3" name="Content Placeholder 2">
@@ -12082,19 +12131,13 @@
               <a:p>
                 <a:r>
                   <a:rPr lang="en-US" dirty="0"/>
-                  <a:t>Make trajectories by changing values accordingly</a:t>
-                </a:r>
-              </a:p>
-              <a:p>
-                <a:r>
-                  <a:rPr lang="en-US" dirty="0"/>
                   <a:t>Try a numerical simulation</a:t>
                 </a:r>
               </a:p>
             </p:txBody>
           </p:sp>
         </mc:Choice>
-        <mc:Fallback xmlns="">
+        <mc:Fallback>
           <p:sp>
             <p:nvSpPr>
               <p:cNvPr id="3" name="Content Placeholder 2">
@@ -12115,7 +12158,7 @@
               <a:blipFill>
                 <a:blip r:embed="rId3"/>
                 <a:stretch>
-                  <a:fillRect l="-965" t="-2632"/>
+                  <a:fillRect l="-1043" t="-2241"/>
                 </a:stretch>
               </a:blipFill>
             </p:spPr>
@@ -12138,6 +12181,94 @@
     <p:extLst>
       <p:ext uri="{BB962C8B-B14F-4D97-AF65-F5344CB8AC3E}">
         <p14:creationId xmlns:p14="http://schemas.microsoft.com/office/powerpoint/2010/main" val="836067812"/>
+      </p:ext>
+    </p:extLst>
+  </p:cSld>
+  <p:clrMapOvr>
+    <a:masterClrMapping/>
+  </p:clrMapOvr>
+</p:sld>
+</file>
+
+<file path=ppt/slides/slide21.xml><?xml version="1.0" encoding="utf-8"?>
+<p:sld xmlns:a="http://schemas.openxmlformats.org/drawingml/2006/main" xmlns:r="http://schemas.openxmlformats.org/officeDocument/2006/relationships" xmlns:p="http://schemas.openxmlformats.org/presentationml/2006/main">
+  <p:cSld>
+    <p:spTree>
+      <p:nvGrpSpPr>
+        <p:cNvPr id="1" name=""/>
+        <p:cNvGrpSpPr/>
+        <p:nvPr/>
+      </p:nvGrpSpPr>
+      <p:grpSpPr>
+        <a:xfrm>
+          <a:off x="0" y="0"/>
+          <a:ext cx="0" cy="0"/>
+          <a:chOff x="0" y="0"/>
+          <a:chExt cx="0" cy="0"/>
+        </a:xfrm>
+      </p:grpSpPr>
+      <p:sp>
+        <p:nvSpPr>
+          <p:cNvPr id="2" name="Title 1">
+            <a:extLst>
+              <a:ext uri="{FF2B5EF4-FFF2-40B4-BE49-F238E27FC236}">
+                <a16:creationId xmlns:a16="http://schemas.microsoft.com/office/drawing/2014/main" id="{AD9E2441-4E13-4AA1-952A-C556629D2991}"/>
+              </a:ext>
+            </a:extLst>
+          </p:cNvPr>
+          <p:cNvSpPr>
+            <a:spLocks noGrp="1"/>
+          </p:cNvSpPr>
+          <p:nvPr>
+            <p:ph type="title"/>
+          </p:nvPr>
+        </p:nvSpPr>
+        <p:spPr/>
+        <p:txBody>
+          <a:bodyPr/>
+          <a:lstStyle/>
+          <a:p>
+            <a:r>
+              <a:rPr lang="en-US" dirty="0"/>
+              <a:t>References</a:t>
+            </a:r>
+          </a:p>
+        </p:txBody>
+      </p:sp>
+      <p:sp>
+        <p:nvSpPr>
+          <p:cNvPr id="3" name="Content Placeholder 2">
+            <a:extLst>
+              <a:ext uri="{FF2B5EF4-FFF2-40B4-BE49-F238E27FC236}">
+                <a16:creationId xmlns:a16="http://schemas.microsoft.com/office/drawing/2014/main" id="{0B30941A-6F81-470A-A4E5-1C331CE84F6E}"/>
+              </a:ext>
+            </a:extLst>
+          </p:cNvPr>
+          <p:cNvSpPr>
+            <a:spLocks noGrp="1"/>
+          </p:cNvSpPr>
+          <p:nvPr>
+            <p:ph idx="1"/>
+          </p:nvPr>
+        </p:nvSpPr>
+        <p:spPr/>
+        <p:txBody>
+          <a:bodyPr>
+            <a:normAutofit/>
+          </a:bodyPr>
+          <a:lstStyle/>
+          <a:p>
+            <a:r>
+              <a:rPr lang="en-US" sz="3600" dirty="0"/>
+              <a:t>Dr. D’Alessandro </a:t>
+            </a:r>
+          </a:p>
+        </p:txBody>
+      </p:sp>
+    </p:spTree>
+    <p:extLst>
+      <p:ext uri="{BB962C8B-B14F-4D97-AF65-F5344CB8AC3E}">
+        <p14:creationId xmlns:p14="http://schemas.microsoft.com/office/powerpoint/2010/main" val="2371736756"/>
       </p:ext>
     </p:extLst>
   </p:cSld>

</xml_diff>